<commit_message>
Add classes and inheritance section
</commit_message>
<xml_diff>
--- a/Presentacion.pptx
+++ b/Presentacion.pptx
@@ -5,7 +5,7 @@
     <p:sldMasterId id="2147483648" r:id="rId1"/>
   </p:sldMasterIdLst>
   <p:notesMasterIdLst>
-    <p:notesMasterId r:id="rId60"/>
+    <p:notesMasterId r:id="rId63"/>
   </p:notesMasterIdLst>
   <p:sldIdLst>
     <p:sldId id="256" r:id="rId2"/>
@@ -56,16 +56,19 @@
     <p:sldId id="307" r:id="rId47"/>
     <p:sldId id="308" r:id="rId48"/>
     <p:sldId id="310" r:id="rId49"/>
-    <p:sldId id="301" r:id="rId50"/>
-    <p:sldId id="311" r:id="rId51"/>
-    <p:sldId id="312" r:id="rId52"/>
-    <p:sldId id="313" r:id="rId53"/>
-    <p:sldId id="314" r:id="rId54"/>
-    <p:sldId id="315" r:id="rId55"/>
-    <p:sldId id="316" r:id="rId56"/>
-    <p:sldId id="317" r:id="rId57"/>
-    <p:sldId id="318" r:id="rId58"/>
-    <p:sldId id="319" r:id="rId59"/>
+    <p:sldId id="311" r:id="rId50"/>
+    <p:sldId id="312" r:id="rId51"/>
+    <p:sldId id="313" r:id="rId52"/>
+    <p:sldId id="314" r:id="rId53"/>
+    <p:sldId id="315" r:id="rId54"/>
+    <p:sldId id="316" r:id="rId55"/>
+    <p:sldId id="317" r:id="rId56"/>
+    <p:sldId id="320" r:id="rId57"/>
+    <p:sldId id="321" r:id="rId58"/>
+    <p:sldId id="322" r:id="rId59"/>
+    <p:sldId id="323" r:id="rId60"/>
+    <p:sldId id="318" r:id="rId61"/>
+    <p:sldId id="319" r:id="rId62"/>
   </p:sldIdLst>
   <p:sldSz cx="12192000" cy="6858000"/>
   <p:notesSz cx="6858000" cy="9144000"/>
@@ -254,7 +257,7 @@
           <a:p>
             <a:fld id="{B1F018D7-01AD-4413-ACF1-CA5C284ABF1D}" type="datetimeFigureOut">
               <a:rPr lang="es-ES" smtClean="0"/>
-              <a:t>22/05/2022</a:t>
+              <a:t>23/05/2022</a:t>
             </a:fld>
             <a:endParaRPr lang="es-ES"/>
           </a:p>
@@ -1004,7 +1007,7 @@
           <a:p>
             <a:fld id="{17321F09-57B9-4431-8E2D-17B39AD68799}" type="datetimeFigureOut">
               <a:rPr lang="es-ES" smtClean="0"/>
-              <a:t>22/05/2022</a:t>
+              <a:t>23/05/2022</a:t>
             </a:fld>
             <a:endParaRPr lang="es-ES"/>
           </a:p>
@@ -1202,7 +1205,7 @@
           <a:p>
             <a:fld id="{17321F09-57B9-4431-8E2D-17B39AD68799}" type="datetimeFigureOut">
               <a:rPr lang="es-ES" smtClean="0"/>
-              <a:t>22/05/2022</a:t>
+              <a:t>23/05/2022</a:t>
             </a:fld>
             <a:endParaRPr lang="es-ES"/>
           </a:p>
@@ -1410,7 +1413,7 @@
           <a:p>
             <a:fld id="{17321F09-57B9-4431-8E2D-17B39AD68799}" type="datetimeFigureOut">
               <a:rPr lang="es-ES" smtClean="0"/>
-              <a:t>22/05/2022</a:t>
+              <a:t>23/05/2022</a:t>
             </a:fld>
             <a:endParaRPr lang="es-ES"/>
           </a:p>
@@ -1608,7 +1611,7 @@
           <a:p>
             <a:fld id="{17321F09-57B9-4431-8E2D-17B39AD68799}" type="datetimeFigureOut">
               <a:rPr lang="es-ES" smtClean="0"/>
-              <a:t>22/05/2022</a:t>
+              <a:t>23/05/2022</a:t>
             </a:fld>
             <a:endParaRPr lang="es-ES"/>
           </a:p>
@@ -1883,7 +1886,7 @@
           <a:p>
             <a:fld id="{17321F09-57B9-4431-8E2D-17B39AD68799}" type="datetimeFigureOut">
               <a:rPr lang="es-ES" smtClean="0"/>
-              <a:t>22/05/2022</a:t>
+              <a:t>23/05/2022</a:t>
             </a:fld>
             <a:endParaRPr lang="es-ES"/>
           </a:p>
@@ -2148,7 +2151,7 @@
           <a:p>
             <a:fld id="{17321F09-57B9-4431-8E2D-17B39AD68799}" type="datetimeFigureOut">
               <a:rPr lang="es-ES" smtClean="0"/>
-              <a:t>22/05/2022</a:t>
+              <a:t>23/05/2022</a:t>
             </a:fld>
             <a:endParaRPr lang="es-ES"/>
           </a:p>
@@ -2560,7 +2563,7 @@
           <a:p>
             <a:fld id="{17321F09-57B9-4431-8E2D-17B39AD68799}" type="datetimeFigureOut">
               <a:rPr lang="es-ES" smtClean="0"/>
-              <a:t>22/05/2022</a:t>
+              <a:t>23/05/2022</a:t>
             </a:fld>
             <a:endParaRPr lang="es-ES"/>
           </a:p>
@@ -2701,7 +2704,7 @@
           <a:p>
             <a:fld id="{17321F09-57B9-4431-8E2D-17B39AD68799}" type="datetimeFigureOut">
               <a:rPr lang="es-ES" smtClean="0"/>
-              <a:t>22/05/2022</a:t>
+              <a:t>23/05/2022</a:t>
             </a:fld>
             <a:endParaRPr lang="es-ES"/>
           </a:p>
@@ -2814,7 +2817,7 @@
           <a:p>
             <a:fld id="{17321F09-57B9-4431-8E2D-17B39AD68799}" type="datetimeFigureOut">
               <a:rPr lang="es-ES" smtClean="0"/>
-              <a:t>22/05/2022</a:t>
+              <a:t>23/05/2022</a:t>
             </a:fld>
             <a:endParaRPr lang="es-ES"/>
           </a:p>
@@ -3125,7 +3128,7 @@
           <a:p>
             <a:fld id="{17321F09-57B9-4431-8E2D-17B39AD68799}" type="datetimeFigureOut">
               <a:rPr lang="es-ES" smtClean="0"/>
-              <a:t>22/05/2022</a:t>
+              <a:t>23/05/2022</a:t>
             </a:fld>
             <a:endParaRPr lang="es-ES"/>
           </a:p>
@@ -3413,7 +3416,7 @@
           <a:p>
             <a:fld id="{17321F09-57B9-4431-8E2D-17B39AD68799}" type="datetimeFigureOut">
               <a:rPr lang="es-ES" smtClean="0"/>
-              <a:t>22/05/2022</a:t>
+              <a:t>23/05/2022</a:t>
             </a:fld>
             <a:endParaRPr lang="es-ES"/>
           </a:p>
@@ -3654,7 +3657,7 @@
           <a:p>
             <a:fld id="{17321F09-57B9-4431-8E2D-17B39AD68799}" type="datetimeFigureOut">
               <a:rPr lang="es-ES" smtClean="0"/>
-              <a:t>22/05/2022</a:t>
+              <a:t>23/05/2022</a:t>
             </a:fld>
             <a:endParaRPr lang="es-ES"/>
           </a:p>
@@ -11521,7 +11524,7 @@
         </p:spPr>
         <p:txBody>
           <a:bodyPr>
-            <a:normAutofit fontScale="92500"/>
+            <a:normAutofit/>
           </a:bodyPr>
           <a:lstStyle/>
           <a:p>
@@ -11666,15 +11669,6 @@
             <a:r>
               <a:rPr lang="en-US" dirty="0"/>
               <a:t> -1.</a:t>
-            </a:r>
-          </a:p>
-          <a:p>
-            <a:pPr marL="0" indent="0" algn="just">
-              <a:buNone/>
-            </a:pPr>
-            <a:r>
-              <a:rPr lang="es-ES" dirty="0"/>
-              <a:t>12- Dado un array de números, devolver true si todos los elementos son pares. False en caso contrario.</a:t>
             </a:r>
           </a:p>
         </p:txBody>
@@ -11693,247 +11687,6 @@
 </file>
 
 <file path=ppt/slides/slide49.xml><?xml version="1.0" encoding="utf-8"?>
-<p:sld xmlns:a="http://schemas.openxmlformats.org/drawingml/2006/main" xmlns:r="http://schemas.openxmlformats.org/officeDocument/2006/relationships" xmlns:p="http://schemas.openxmlformats.org/presentationml/2006/main">
-  <p:cSld>
-    <p:spTree>
-      <p:nvGrpSpPr>
-        <p:cNvPr id="1" name=""/>
-        <p:cNvGrpSpPr/>
-        <p:nvPr/>
-      </p:nvGrpSpPr>
-      <p:grpSpPr>
-        <a:xfrm>
-          <a:off x="0" y="0"/>
-          <a:ext cx="0" cy="0"/>
-          <a:chOff x="0" y="0"/>
-          <a:chExt cx="0" cy="0"/>
-        </a:xfrm>
-      </p:grpSpPr>
-      <p:sp>
-        <p:nvSpPr>
-          <p:cNvPr id="2" name="Título 1">
-            <a:extLst>
-              <a:ext uri="{FF2B5EF4-FFF2-40B4-BE49-F238E27FC236}">
-                <a16:creationId xmlns:a16="http://schemas.microsoft.com/office/drawing/2014/main" id="{7F6D2EFD-F303-41CF-9F11-50D48D204DF7}"/>
-              </a:ext>
-            </a:extLst>
-          </p:cNvPr>
-          <p:cNvSpPr>
-            <a:spLocks noGrp="1"/>
-          </p:cNvSpPr>
-          <p:nvPr>
-            <p:ph type="title"/>
-          </p:nvPr>
-        </p:nvSpPr>
-        <p:spPr/>
-        <p:txBody>
-          <a:bodyPr/>
-          <a:lstStyle/>
-          <a:p>
-            <a:r>
-              <a:rPr lang="es-ES" dirty="0"/>
-              <a:t>Time </a:t>
-            </a:r>
-            <a:r>
-              <a:rPr lang="es-ES" dirty="0" err="1"/>
-              <a:t>to</a:t>
-            </a:r>
-            <a:r>
-              <a:rPr lang="es-ES" dirty="0"/>
-              <a:t> </a:t>
-            </a:r>
-            <a:r>
-              <a:rPr lang="es-ES" dirty="0" err="1"/>
-              <a:t>practice</a:t>
-            </a:r>
-            <a:endParaRPr lang="es-ES" dirty="0"/>
-          </a:p>
-        </p:txBody>
-      </p:sp>
-      <p:sp>
-        <p:nvSpPr>
-          <p:cNvPr id="3" name="Marcador de contenido 2">
-            <a:extLst>
-              <a:ext uri="{FF2B5EF4-FFF2-40B4-BE49-F238E27FC236}">
-                <a16:creationId xmlns:a16="http://schemas.microsoft.com/office/drawing/2014/main" id="{731A288A-6FDC-4FD8-B171-45EF3E82C3A6}"/>
-              </a:ext>
-            </a:extLst>
-          </p:cNvPr>
-          <p:cNvSpPr>
-            <a:spLocks noGrp="1"/>
-          </p:cNvSpPr>
-          <p:nvPr>
-            <p:ph idx="1"/>
-          </p:nvPr>
-        </p:nvSpPr>
-        <p:spPr/>
-        <p:txBody>
-          <a:bodyPr/>
-          <a:lstStyle/>
-          <a:p>
-            <a:r>
-              <a:rPr lang="es-ES" dirty="0"/>
-              <a:t>13- Dado un array de números, devolver un array con los números pares.</a:t>
-            </a:r>
-          </a:p>
-          <a:p>
-            <a:r>
-              <a:rPr lang="es-ES" dirty="0"/>
-              <a:t>14- Agregar un elemento en un array de números al final.</a:t>
-            </a:r>
-          </a:p>
-          <a:p>
-            <a:r>
-              <a:rPr lang="es-ES" dirty="0"/>
-              <a:t>15- Dados 2 </a:t>
-            </a:r>
-            <a:r>
-              <a:rPr lang="es-ES" dirty="0" err="1"/>
-              <a:t>arrays</a:t>
-            </a:r>
-            <a:r>
-              <a:rPr lang="es-ES" dirty="0"/>
-              <a:t> de números, devolver un array con la unión </a:t>
-            </a:r>
-            <a:r>
-              <a:rPr lang="es-ES"/>
-              <a:t>de los anteriores.</a:t>
-            </a:r>
-            <a:endParaRPr lang="es-ES" dirty="0"/>
-          </a:p>
-          <a:p>
-            <a:endParaRPr lang="es-ES" dirty="0"/>
-          </a:p>
-        </p:txBody>
-      </p:sp>
-    </p:spTree>
-    <p:extLst>
-      <p:ext uri="{BB962C8B-B14F-4D97-AF65-F5344CB8AC3E}">
-        <p14:creationId xmlns:p14="http://schemas.microsoft.com/office/powerpoint/2010/main" val="957785590"/>
-      </p:ext>
-    </p:extLst>
-  </p:cSld>
-  <p:clrMapOvr>
-    <a:masterClrMapping/>
-  </p:clrMapOvr>
-</p:sld>
-</file>
-
-<file path=ppt/slides/slide5.xml><?xml version="1.0" encoding="utf-8"?>
-<p:sld xmlns:a="http://schemas.openxmlformats.org/drawingml/2006/main" xmlns:r="http://schemas.openxmlformats.org/officeDocument/2006/relationships" xmlns:p="http://schemas.openxmlformats.org/presentationml/2006/main">
-  <p:cSld>
-    <p:spTree>
-      <p:nvGrpSpPr>
-        <p:cNvPr id="1" name=""/>
-        <p:cNvGrpSpPr/>
-        <p:nvPr/>
-      </p:nvGrpSpPr>
-      <p:grpSpPr>
-        <a:xfrm>
-          <a:off x="0" y="0"/>
-          <a:ext cx="0" cy="0"/>
-          <a:chOff x="0" y="0"/>
-          <a:chExt cx="0" cy="0"/>
-        </a:xfrm>
-      </p:grpSpPr>
-      <p:sp>
-        <p:nvSpPr>
-          <p:cNvPr id="2" name="Título 1">
-            <a:extLst>
-              <a:ext uri="{FF2B5EF4-FFF2-40B4-BE49-F238E27FC236}">
-                <a16:creationId xmlns:a16="http://schemas.microsoft.com/office/drawing/2014/main" id="{1280A393-407B-440E-B731-B604A7E78E76}"/>
-              </a:ext>
-            </a:extLst>
-          </p:cNvPr>
-          <p:cNvSpPr>
-            <a:spLocks noGrp="1"/>
-          </p:cNvSpPr>
-          <p:nvPr>
-            <p:ph type="title"/>
-          </p:nvPr>
-        </p:nvSpPr>
-        <p:spPr/>
-        <p:txBody>
-          <a:bodyPr/>
-          <a:lstStyle/>
-          <a:p>
-            <a:r>
-              <a:rPr lang="es-ES" dirty="0"/>
-              <a:t>Requisitos</a:t>
-            </a:r>
-          </a:p>
-        </p:txBody>
-      </p:sp>
-      <p:sp>
-        <p:nvSpPr>
-          <p:cNvPr id="3" name="Marcador de contenido 2">
-            <a:extLst>
-              <a:ext uri="{FF2B5EF4-FFF2-40B4-BE49-F238E27FC236}">
-                <a16:creationId xmlns:a16="http://schemas.microsoft.com/office/drawing/2014/main" id="{22DEC23A-6199-4323-883A-15FC89F30DB8}"/>
-              </a:ext>
-            </a:extLst>
-          </p:cNvPr>
-          <p:cNvSpPr>
-            <a:spLocks noGrp="1"/>
-          </p:cNvSpPr>
-          <p:nvPr>
-            <p:ph idx="1"/>
-          </p:nvPr>
-        </p:nvSpPr>
-        <p:spPr/>
-        <p:txBody>
-          <a:bodyPr/>
-          <a:lstStyle/>
-          <a:p>
-            <a:pPr algn="just"/>
-            <a:r>
-              <a:rPr lang="es-ES" dirty="0"/>
-              <a:t>Git</a:t>
-            </a:r>
-          </a:p>
-          <a:p>
-            <a:pPr algn="just"/>
-            <a:r>
-              <a:rPr lang="es-ES" dirty="0" err="1"/>
-              <a:t>NodeJS</a:t>
-            </a:r>
-            <a:endParaRPr lang="es-ES" dirty="0"/>
-          </a:p>
-          <a:p>
-            <a:pPr algn="just"/>
-            <a:r>
-              <a:rPr lang="es-ES" dirty="0"/>
-              <a:t>Visual Studio </a:t>
-            </a:r>
-            <a:r>
-              <a:rPr lang="es-ES" dirty="0" err="1"/>
-              <a:t>Code</a:t>
-            </a:r>
-            <a:endParaRPr lang="es-ES" dirty="0"/>
-          </a:p>
-          <a:p>
-            <a:pPr algn="just"/>
-            <a:r>
-              <a:rPr lang="es-ES" dirty="0"/>
-              <a:t>OpenSSL</a:t>
-            </a:r>
-          </a:p>
-        </p:txBody>
-      </p:sp>
-    </p:spTree>
-    <p:extLst>
-      <p:ext uri="{BB962C8B-B14F-4D97-AF65-F5344CB8AC3E}">
-        <p14:creationId xmlns:p14="http://schemas.microsoft.com/office/powerpoint/2010/main" val="129452445"/>
-      </p:ext>
-    </p:extLst>
-  </p:cSld>
-  <p:clrMapOvr>
-    <a:masterClrMapping/>
-  </p:clrMapOvr>
-</p:sld>
-</file>
-
-<file path=ppt/slides/slide50.xml><?xml version="1.0" encoding="utf-8"?>
 <p:sld xmlns:a="http://schemas.openxmlformats.org/drawingml/2006/main" xmlns:r="http://schemas.openxmlformats.org/officeDocument/2006/relationships" xmlns:p="http://schemas.openxmlformats.org/presentationml/2006/main">
   <p:cSld>
     <p:spTree>
@@ -12021,7 +11774,121 @@
 </p:sld>
 </file>
 
-<file path=ppt/slides/slide51.xml><?xml version="1.0" encoding="utf-8"?>
+<file path=ppt/slides/slide5.xml><?xml version="1.0" encoding="utf-8"?>
+<p:sld xmlns:a="http://schemas.openxmlformats.org/drawingml/2006/main" xmlns:r="http://schemas.openxmlformats.org/officeDocument/2006/relationships" xmlns:p="http://schemas.openxmlformats.org/presentationml/2006/main">
+  <p:cSld>
+    <p:spTree>
+      <p:nvGrpSpPr>
+        <p:cNvPr id="1" name=""/>
+        <p:cNvGrpSpPr/>
+        <p:nvPr/>
+      </p:nvGrpSpPr>
+      <p:grpSpPr>
+        <a:xfrm>
+          <a:off x="0" y="0"/>
+          <a:ext cx="0" cy="0"/>
+          <a:chOff x="0" y="0"/>
+          <a:chExt cx="0" cy="0"/>
+        </a:xfrm>
+      </p:grpSpPr>
+      <p:sp>
+        <p:nvSpPr>
+          <p:cNvPr id="2" name="Título 1">
+            <a:extLst>
+              <a:ext uri="{FF2B5EF4-FFF2-40B4-BE49-F238E27FC236}">
+                <a16:creationId xmlns:a16="http://schemas.microsoft.com/office/drawing/2014/main" id="{1280A393-407B-440E-B731-B604A7E78E76}"/>
+              </a:ext>
+            </a:extLst>
+          </p:cNvPr>
+          <p:cNvSpPr>
+            <a:spLocks noGrp="1"/>
+          </p:cNvSpPr>
+          <p:nvPr>
+            <p:ph type="title"/>
+          </p:nvPr>
+        </p:nvSpPr>
+        <p:spPr/>
+        <p:txBody>
+          <a:bodyPr/>
+          <a:lstStyle/>
+          <a:p>
+            <a:r>
+              <a:rPr lang="es-ES" dirty="0"/>
+              <a:t>Requisitos</a:t>
+            </a:r>
+          </a:p>
+        </p:txBody>
+      </p:sp>
+      <p:sp>
+        <p:nvSpPr>
+          <p:cNvPr id="3" name="Marcador de contenido 2">
+            <a:extLst>
+              <a:ext uri="{FF2B5EF4-FFF2-40B4-BE49-F238E27FC236}">
+                <a16:creationId xmlns:a16="http://schemas.microsoft.com/office/drawing/2014/main" id="{22DEC23A-6199-4323-883A-15FC89F30DB8}"/>
+              </a:ext>
+            </a:extLst>
+          </p:cNvPr>
+          <p:cNvSpPr>
+            <a:spLocks noGrp="1"/>
+          </p:cNvSpPr>
+          <p:nvPr>
+            <p:ph idx="1"/>
+          </p:nvPr>
+        </p:nvSpPr>
+        <p:spPr/>
+        <p:txBody>
+          <a:bodyPr/>
+          <a:lstStyle/>
+          <a:p>
+            <a:pPr algn="just"/>
+            <a:r>
+              <a:rPr lang="es-ES" dirty="0"/>
+              <a:t>Git</a:t>
+            </a:r>
+          </a:p>
+          <a:p>
+            <a:pPr algn="just"/>
+            <a:r>
+              <a:rPr lang="es-ES" dirty="0" err="1"/>
+              <a:t>NodeJS</a:t>
+            </a:r>
+            <a:endParaRPr lang="es-ES" dirty="0"/>
+          </a:p>
+          <a:p>
+            <a:pPr algn="just"/>
+            <a:r>
+              <a:rPr lang="es-ES" dirty="0"/>
+              <a:t>Visual Studio </a:t>
+            </a:r>
+            <a:r>
+              <a:rPr lang="es-ES" dirty="0" err="1"/>
+              <a:t>Code</a:t>
+            </a:r>
+            <a:endParaRPr lang="es-ES" dirty="0"/>
+          </a:p>
+          <a:p>
+            <a:pPr algn="just"/>
+            <a:r>
+              <a:rPr lang="es-ES" dirty="0"/>
+              <a:t>OpenSSL</a:t>
+            </a:r>
+          </a:p>
+        </p:txBody>
+      </p:sp>
+    </p:spTree>
+    <p:extLst>
+      <p:ext uri="{BB962C8B-B14F-4D97-AF65-F5344CB8AC3E}">
+        <p14:creationId xmlns:p14="http://schemas.microsoft.com/office/powerpoint/2010/main" val="129452445"/>
+      </p:ext>
+    </p:extLst>
+  </p:cSld>
+  <p:clrMapOvr>
+    <a:masterClrMapping/>
+  </p:clrMapOvr>
+</p:sld>
+</file>
+
+<file path=ppt/slides/slide50.xml><?xml version="1.0" encoding="utf-8"?>
 <p:sld xmlns:a="http://schemas.openxmlformats.org/drawingml/2006/main" xmlns:r="http://schemas.openxmlformats.org/officeDocument/2006/relationships" xmlns:p="http://schemas.openxmlformats.org/presentationml/2006/main">
   <p:cSld>
     <p:spTree>
@@ -12109,7 +11976,7 @@
 </p:sld>
 </file>
 
-<file path=ppt/slides/slide52.xml><?xml version="1.0" encoding="utf-8"?>
+<file path=ppt/slides/slide51.xml><?xml version="1.0" encoding="utf-8"?>
 <p:sld xmlns:a="http://schemas.openxmlformats.org/drawingml/2006/main" xmlns:r="http://schemas.openxmlformats.org/officeDocument/2006/relationships" xmlns:p="http://schemas.openxmlformats.org/presentationml/2006/main">
   <p:cSld>
     <p:spTree>
@@ -12197,7 +12064,7 @@
 </p:sld>
 </file>
 
-<file path=ppt/slides/slide53.xml><?xml version="1.0" encoding="utf-8"?>
+<file path=ppt/slides/slide52.xml><?xml version="1.0" encoding="utf-8"?>
 <p:sld xmlns:a="http://schemas.openxmlformats.org/drawingml/2006/main" xmlns:r="http://schemas.openxmlformats.org/officeDocument/2006/relationships" xmlns:p="http://schemas.openxmlformats.org/presentationml/2006/main">
   <p:cSld>
     <p:spTree>
@@ -12345,7 +12212,7 @@
 </p:sld>
 </file>
 
-<file path=ppt/slides/slide54.xml><?xml version="1.0" encoding="utf-8"?>
+<file path=ppt/slides/slide53.xml><?xml version="1.0" encoding="utf-8"?>
 <p:sld xmlns:a="http://schemas.openxmlformats.org/drawingml/2006/main" xmlns:r="http://schemas.openxmlformats.org/officeDocument/2006/relationships" xmlns:p="http://schemas.openxmlformats.org/presentationml/2006/main">
   <p:cSld>
     <p:spTree>
@@ -12575,7 +12442,7 @@
 </p:sld>
 </file>
 
-<file path=ppt/slides/slide55.xml><?xml version="1.0" encoding="utf-8"?>
+<file path=ppt/slides/slide54.xml><?xml version="1.0" encoding="utf-8"?>
 <p:sld xmlns:a="http://schemas.openxmlformats.org/drawingml/2006/main" xmlns:r="http://schemas.openxmlformats.org/officeDocument/2006/relationships" xmlns:p="http://schemas.openxmlformats.org/presentationml/2006/main">
   <p:cSld>
     <p:spTree>
@@ -12697,6 +12564,157 @@
 </p:sld>
 </file>
 
+<file path=ppt/slides/slide55.xml><?xml version="1.0" encoding="utf-8"?>
+<p:sld xmlns:a="http://schemas.openxmlformats.org/drawingml/2006/main" xmlns:r="http://schemas.openxmlformats.org/officeDocument/2006/relationships" xmlns:p="http://schemas.openxmlformats.org/presentationml/2006/main">
+  <p:cSld>
+    <p:spTree>
+      <p:nvGrpSpPr>
+        <p:cNvPr id="1" name=""/>
+        <p:cNvGrpSpPr/>
+        <p:nvPr/>
+      </p:nvGrpSpPr>
+      <p:grpSpPr>
+        <a:xfrm>
+          <a:off x="0" y="0"/>
+          <a:ext cx="0" cy="0"/>
+          <a:chOff x="0" y="0"/>
+          <a:chExt cx="0" cy="0"/>
+        </a:xfrm>
+      </p:grpSpPr>
+      <p:sp>
+        <p:nvSpPr>
+          <p:cNvPr id="2" name="Título 1">
+            <a:extLst>
+              <a:ext uri="{FF2B5EF4-FFF2-40B4-BE49-F238E27FC236}">
+                <a16:creationId xmlns:a16="http://schemas.microsoft.com/office/drawing/2014/main" id="{AC38FEF4-6A28-47C2-B976-7D73ADC8D024}"/>
+              </a:ext>
+            </a:extLst>
+          </p:cNvPr>
+          <p:cNvSpPr>
+            <a:spLocks noGrp="1"/>
+          </p:cNvSpPr>
+          <p:nvPr>
+            <p:ph type="title"/>
+          </p:nvPr>
+        </p:nvSpPr>
+        <p:spPr/>
+        <p:txBody>
+          <a:bodyPr/>
+          <a:lstStyle/>
+          <a:p>
+            <a:r>
+              <a:rPr lang="es-ES" dirty="0"/>
+              <a:t>Time </a:t>
+            </a:r>
+            <a:r>
+              <a:rPr lang="es-ES" dirty="0" err="1"/>
+              <a:t>to</a:t>
+            </a:r>
+            <a:r>
+              <a:rPr lang="es-ES" dirty="0"/>
+              <a:t> </a:t>
+            </a:r>
+            <a:r>
+              <a:rPr lang="es-ES" dirty="0" err="1"/>
+              <a:t>practice</a:t>
+            </a:r>
+            <a:endParaRPr lang="es-ES" dirty="0"/>
+          </a:p>
+        </p:txBody>
+      </p:sp>
+      <p:sp>
+        <p:nvSpPr>
+          <p:cNvPr id="3" name="Marcador de contenido 2">
+            <a:extLst>
+              <a:ext uri="{FF2B5EF4-FFF2-40B4-BE49-F238E27FC236}">
+                <a16:creationId xmlns:a16="http://schemas.microsoft.com/office/drawing/2014/main" id="{695CCDEB-05A1-4B53-850A-C38A513AE085}"/>
+              </a:ext>
+            </a:extLst>
+          </p:cNvPr>
+          <p:cNvSpPr>
+            <a:spLocks noGrp="1"/>
+          </p:cNvSpPr>
+          <p:nvPr>
+            <p:ph idx="1"/>
+          </p:nvPr>
+        </p:nvSpPr>
+        <p:spPr/>
+        <p:txBody>
+          <a:bodyPr/>
+          <a:lstStyle/>
+          <a:p>
+            <a:pPr algn="just"/>
+            <a:r>
+              <a:rPr lang="es-ES" dirty="0"/>
+              <a:t>Refactorizar los ejercicios anteriores usando funciones.</a:t>
+            </a:r>
+          </a:p>
+          <a:p>
+            <a:pPr algn="just"/>
+            <a:endParaRPr lang="es-ES" dirty="0"/>
+          </a:p>
+          <a:p>
+            <a:pPr marL="0" indent="0" algn="just">
+              <a:buNone/>
+            </a:pPr>
+            <a:r>
+              <a:rPr lang="es-ES" dirty="0"/>
+              <a:t>12- Dado un array de números, devolver true si todos los elementos son pares. False en caso contrario.</a:t>
+            </a:r>
+          </a:p>
+          <a:p>
+            <a:pPr marL="0" indent="0" algn="just">
+              <a:buNone/>
+            </a:pPr>
+            <a:r>
+              <a:rPr lang="es-ES" dirty="0"/>
+              <a:t>13- Dado un array de números, devolver un array con los números pares.</a:t>
+            </a:r>
+          </a:p>
+          <a:p>
+            <a:pPr marL="0" indent="0" algn="just">
+              <a:buNone/>
+            </a:pPr>
+            <a:r>
+              <a:rPr lang="es-ES" dirty="0"/>
+              <a:t>14- Dados 2 </a:t>
+            </a:r>
+            <a:r>
+              <a:rPr lang="es-ES" dirty="0" err="1"/>
+              <a:t>arrays</a:t>
+            </a:r>
+            <a:r>
+              <a:rPr lang="es-ES" dirty="0"/>
+              <a:t> de números, devolver un array con la unión de los anteriores.</a:t>
+            </a:r>
+          </a:p>
+          <a:p>
+            <a:pPr algn="just"/>
+            <a:endParaRPr lang="es-ES" dirty="0"/>
+          </a:p>
+          <a:p>
+            <a:pPr algn="just"/>
+            <a:endParaRPr lang="es-ES" dirty="0"/>
+          </a:p>
+          <a:p>
+            <a:pPr algn="just"/>
+            <a:endParaRPr lang="es-ES" dirty="0"/>
+          </a:p>
+        </p:txBody>
+      </p:sp>
+    </p:spTree>
+    <p:extLst>
+      <p:ext uri="{BB962C8B-B14F-4D97-AF65-F5344CB8AC3E}">
+        <p14:creationId xmlns:p14="http://schemas.microsoft.com/office/powerpoint/2010/main" val="2960504698"/>
+      </p:ext>
+    </p:extLst>
+  </p:cSld>
+  <p:clrMapOvr>
+    <a:masterClrMapping/>
+  </p:clrMapOvr>
+</p:sld>
+</file>
+
 <file path=ppt/slides/slide56.xml><?xml version="1.0" encoding="utf-8"?>
 <p:sld xmlns:a="http://schemas.openxmlformats.org/drawingml/2006/main" xmlns:r="http://schemas.openxmlformats.org/officeDocument/2006/relationships" xmlns:p="http://schemas.openxmlformats.org/presentationml/2006/main">
   <p:cSld>
@@ -12719,7 +12737,7 @@
           <p:cNvPr id="2" name="Título 1">
             <a:extLst>
               <a:ext uri="{FF2B5EF4-FFF2-40B4-BE49-F238E27FC236}">
-                <a16:creationId xmlns:a16="http://schemas.microsoft.com/office/drawing/2014/main" id="{AC38FEF4-6A28-47C2-B976-7D73ADC8D024}"/>
+                <a16:creationId xmlns:a16="http://schemas.microsoft.com/office/drawing/2014/main" id="{C05320AE-F38A-44E4-864C-2DBA9822E3DB}"/>
               </a:ext>
             </a:extLst>
           </p:cNvPr>
@@ -12737,59 +12755,45 @@
           <a:p>
             <a:r>
               <a:rPr lang="es-ES" dirty="0"/>
-              <a:t>Time </a:t>
-            </a:r>
-            <a:r>
-              <a:rPr lang="es-ES" dirty="0" err="1"/>
-              <a:t>to</a:t>
-            </a:r>
-            <a:r>
-              <a:rPr lang="es-ES" dirty="0"/>
-              <a:t> </a:t>
-            </a:r>
-            <a:r>
-              <a:rPr lang="es-ES" dirty="0" err="1"/>
-              <a:t>practice</a:t>
-            </a:r>
-            <a:endParaRPr lang="es-ES" dirty="0"/>
-          </a:p>
-        </p:txBody>
-      </p:sp>
-      <p:sp>
-        <p:nvSpPr>
-          <p:cNvPr id="3" name="Marcador de contenido 2">
-            <a:extLst>
-              <a:ext uri="{FF2B5EF4-FFF2-40B4-BE49-F238E27FC236}">
-                <a16:creationId xmlns:a16="http://schemas.microsoft.com/office/drawing/2014/main" id="{695CCDEB-05A1-4B53-850A-C38A513AE085}"/>
-              </a:ext>
-            </a:extLst>
-          </p:cNvPr>
-          <p:cNvSpPr>
-            <a:spLocks noGrp="1"/>
-          </p:cNvSpPr>
-          <p:nvPr>
-            <p:ph idx="1"/>
-          </p:nvPr>
-        </p:nvSpPr>
-        <p:spPr/>
-        <p:txBody>
-          <a:bodyPr/>
-          <a:lstStyle/>
-          <a:p>
-            <a:r>
-              <a:rPr lang="es-ES" dirty="0"/>
-              <a:t>Refactorizar los ejercicios anteriores usando funciones.</a:t>
-            </a:r>
-          </a:p>
-          <a:p>
-            <a:endParaRPr lang="es-ES" dirty="0"/>
-          </a:p>
-        </p:txBody>
-      </p:sp>
+              <a:t>JavaScript básico: clases</a:t>
+            </a:r>
+          </a:p>
+        </p:txBody>
+      </p:sp>
+      <p:pic>
+        <p:nvPicPr>
+          <p:cNvPr id="5" name="Imagen 4">
+            <a:extLst>
+              <a:ext uri="{FF2B5EF4-FFF2-40B4-BE49-F238E27FC236}">
+                <a16:creationId xmlns:a16="http://schemas.microsoft.com/office/drawing/2014/main" id="{04DA7739-36C9-4DCE-9BE5-23CBA14F6037}"/>
+              </a:ext>
+            </a:extLst>
+          </p:cNvPr>
+          <p:cNvPicPr>
+            <a:picLocks noChangeAspect="1"/>
+          </p:cNvPicPr>
+          <p:nvPr/>
+        </p:nvPicPr>
+        <p:blipFill>
+          <a:blip r:embed="rId2"/>
+          <a:stretch>
+            <a:fillRect/>
+          </a:stretch>
+        </p:blipFill>
+        <p:spPr>
+          <a:xfrm>
+            <a:off x="741427" y="1587729"/>
+            <a:ext cx="4600575" cy="2419350"/>
+          </a:xfrm>
+          <a:prstGeom prst="rect">
+            <a:avLst/>
+          </a:prstGeom>
+        </p:spPr>
+      </p:pic>
     </p:spTree>
     <p:extLst>
       <p:ext uri="{BB962C8B-B14F-4D97-AF65-F5344CB8AC3E}">
-        <p14:creationId xmlns:p14="http://schemas.microsoft.com/office/powerpoint/2010/main" val="2960504698"/>
+        <p14:creationId xmlns:p14="http://schemas.microsoft.com/office/powerpoint/2010/main" val="2633129373"/>
       </p:ext>
     </p:extLst>
   </p:cSld>
@@ -12800,6 +12804,435 @@
 </file>
 
 <file path=ppt/slides/slide57.xml><?xml version="1.0" encoding="utf-8"?>
+<p:sld xmlns:a="http://schemas.openxmlformats.org/drawingml/2006/main" xmlns:r="http://schemas.openxmlformats.org/officeDocument/2006/relationships" xmlns:p="http://schemas.openxmlformats.org/presentationml/2006/main">
+  <p:cSld>
+    <p:spTree>
+      <p:nvGrpSpPr>
+        <p:cNvPr id="1" name=""/>
+        <p:cNvGrpSpPr/>
+        <p:nvPr/>
+      </p:nvGrpSpPr>
+      <p:grpSpPr>
+        <a:xfrm>
+          <a:off x="0" y="0"/>
+          <a:ext cx="0" cy="0"/>
+          <a:chOff x="0" y="0"/>
+          <a:chExt cx="0" cy="0"/>
+        </a:xfrm>
+      </p:grpSpPr>
+      <p:sp>
+        <p:nvSpPr>
+          <p:cNvPr id="2" name="Título 1">
+            <a:extLst>
+              <a:ext uri="{FF2B5EF4-FFF2-40B4-BE49-F238E27FC236}">
+                <a16:creationId xmlns:a16="http://schemas.microsoft.com/office/drawing/2014/main" id="{C05320AE-F38A-44E4-864C-2DBA9822E3DB}"/>
+              </a:ext>
+            </a:extLst>
+          </p:cNvPr>
+          <p:cNvSpPr>
+            <a:spLocks noGrp="1"/>
+          </p:cNvSpPr>
+          <p:nvPr>
+            <p:ph type="title"/>
+          </p:nvPr>
+        </p:nvSpPr>
+        <p:spPr/>
+        <p:txBody>
+          <a:bodyPr/>
+          <a:lstStyle/>
+          <a:p>
+            <a:r>
+              <a:rPr lang="es-ES" dirty="0"/>
+              <a:t>JavaScript básico: clases</a:t>
+            </a:r>
+          </a:p>
+        </p:txBody>
+      </p:sp>
+      <p:pic>
+        <p:nvPicPr>
+          <p:cNvPr id="7" name="Imagen 6">
+            <a:extLst>
+              <a:ext uri="{FF2B5EF4-FFF2-40B4-BE49-F238E27FC236}">
+                <a16:creationId xmlns:a16="http://schemas.microsoft.com/office/drawing/2014/main" id="{92FE260E-CD65-412F-8E12-64C543036D34}"/>
+              </a:ext>
+            </a:extLst>
+          </p:cNvPr>
+          <p:cNvPicPr>
+            <a:picLocks noChangeAspect="1"/>
+          </p:cNvPicPr>
+          <p:nvPr/>
+        </p:nvPicPr>
+        <p:blipFill>
+          <a:blip r:embed="rId2"/>
+          <a:stretch>
+            <a:fillRect/>
+          </a:stretch>
+        </p:blipFill>
+        <p:spPr>
+          <a:xfrm>
+            <a:off x="4036979" y="1500480"/>
+            <a:ext cx="5440396" cy="5095582"/>
+          </a:xfrm>
+          <a:prstGeom prst="rect">
+            <a:avLst/>
+          </a:prstGeom>
+        </p:spPr>
+      </p:pic>
+    </p:spTree>
+    <p:extLst>
+      <p:ext uri="{BB962C8B-B14F-4D97-AF65-F5344CB8AC3E}">
+        <p14:creationId xmlns:p14="http://schemas.microsoft.com/office/powerpoint/2010/main" val="1828468284"/>
+      </p:ext>
+    </p:extLst>
+  </p:cSld>
+  <p:clrMapOvr>
+    <a:masterClrMapping/>
+  </p:clrMapOvr>
+</p:sld>
+</file>
+
+<file path=ppt/slides/slide58.xml><?xml version="1.0" encoding="utf-8"?>
+<p:sld xmlns:a="http://schemas.openxmlformats.org/drawingml/2006/main" xmlns:r="http://schemas.openxmlformats.org/officeDocument/2006/relationships" xmlns:p="http://schemas.openxmlformats.org/presentationml/2006/main">
+  <p:cSld>
+    <p:spTree>
+      <p:nvGrpSpPr>
+        <p:cNvPr id="1" name=""/>
+        <p:cNvGrpSpPr/>
+        <p:nvPr/>
+      </p:nvGrpSpPr>
+      <p:grpSpPr>
+        <a:xfrm>
+          <a:off x="0" y="0"/>
+          <a:ext cx="0" cy="0"/>
+          <a:chOff x="0" y="0"/>
+          <a:chExt cx="0" cy="0"/>
+        </a:xfrm>
+      </p:grpSpPr>
+      <p:sp>
+        <p:nvSpPr>
+          <p:cNvPr id="2" name="Título 1">
+            <a:extLst>
+              <a:ext uri="{FF2B5EF4-FFF2-40B4-BE49-F238E27FC236}">
+                <a16:creationId xmlns:a16="http://schemas.microsoft.com/office/drawing/2014/main" id="{C05320AE-F38A-44E4-864C-2DBA9822E3DB}"/>
+              </a:ext>
+            </a:extLst>
+          </p:cNvPr>
+          <p:cNvSpPr>
+            <a:spLocks noGrp="1"/>
+          </p:cNvSpPr>
+          <p:nvPr>
+            <p:ph type="title"/>
+          </p:nvPr>
+        </p:nvSpPr>
+        <p:spPr/>
+        <p:txBody>
+          <a:bodyPr/>
+          <a:lstStyle/>
+          <a:p>
+            <a:r>
+              <a:rPr lang="es-ES" dirty="0"/>
+              <a:t>JavaScript básico: herencia</a:t>
+            </a:r>
+          </a:p>
+        </p:txBody>
+      </p:sp>
+      <p:pic>
+        <p:nvPicPr>
+          <p:cNvPr id="4" name="Imagen 3">
+            <a:extLst>
+              <a:ext uri="{FF2B5EF4-FFF2-40B4-BE49-F238E27FC236}">
+                <a16:creationId xmlns:a16="http://schemas.microsoft.com/office/drawing/2014/main" id="{3230D79D-579E-43FD-A63D-C3C01FF8FFD7}"/>
+              </a:ext>
+            </a:extLst>
+          </p:cNvPr>
+          <p:cNvPicPr>
+            <a:picLocks noChangeAspect="1"/>
+          </p:cNvPicPr>
+          <p:nvPr/>
+        </p:nvPicPr>
+        <p:blipFill>
+          <a:blip r:embed="rId2"/>
+          <a:stretch>
+            <a:fillRect/>
+          </a:stretch>
+        </p:blipFill>
+        <p:spPr>
+          <a:xfrm>
+            <a:off x="3058311" y="1346069"/>
+            <a:ext cx="5924550" cy="5410200"/>
+          </a:xfrm>
+          <a:prstGeom prst="rect">
+            <a:avLst/>
+          </a:prstGeom>
+        </p:spPr>
+      </p:pic>
+    </p:spTree>
+    <p:extLst>
+      <p:ext uri="{BB962C8B-B14F-4D97-AF65-F5344CB8AC3E}">
+        <p14:creationId xmlns:p14="http://schemas.microsoft.com/office/powerpoint/2010/main" val="303350085"/>
+      </p:ext>
+    </p:extLst>
+  </p:cSld>
+  <p:clrMapOvr>
+    <a:masterClrMapping/>
+  </p:clrMapOvr>
+</p:sld>
+</file>
+
+<file path=ppt/slides/slide59.xml><?xml version="1.0" encoding="utf-8"?>
+<p:sld xmlns:a="http://schemas.openxmlformats.org/drawingml/2006/main" xmlns:r="http://schemas.openxmlformats.org/officeDocument/2006/relationships" xmlns:p="http://schemas.openxmlformats.org/presentationml/2006/main">
+  <p:cSld>
+    <p:spTree>
+      <p:nvGrpSpPr>
+        <p:cNvPr id="1" name=""/>
+        <p:cNvGrpSpPr/>
+        <p:nvPr/>
+      </p:nvGrpSpPr>
+      <p:grpSpPr>
+        <a:xfrm>
+          <a:off x="0" y="0"/>
+          <a:ext cx="0" cy="0"/>
+          <a:chOff x="0" y="0"/>
+          <a:chExt cx="0" cy="0"/>
+        </a:xfrm>
+      </p:grpSpPr>
+      <p:sp>
+        <p:nvSpPr>
+          <p:cNvPr id="2" name="Título 1">
+            <a:extLst>
+              <a:ext uri="{FF2B5EF4-FFF2-40B4-BE49-F238E27FC236}">
+                <a16:creationId xmlns:a16="http://schemas.microsoft.com/office/drawing/2014/main" id="{C05320AE-F38A-44E4-864C-2DBA9822E3DB}"/>
+              </a:ext>
+            </a:extLst>
+          </p:cNvPr>
+          <p:cNvSpPr>
+            <a:spLocks noGrp="1"/>
+          </p:cNvSpPr>
+          <p:nvPr>
+            <p:ph type="title"/>
+          </p:nvPr>
+        </p:nvSpPr>
+        <p:spPr/>
+        <p:txBody>
+          <a:bodyPr/>
+          <a:lstStyle/>
+          <a:p>
+            <a:r>
+              <a:rPr lang="es-ES" dirty="0"/>
+              <a:t>JavaScript básico: herencia</a:t>
+            </a:r>
+          </a:p>
+        </p:txBody>
+      </p:sp>
+      <p:pic>
+        <p:nvPicPr>
+          <p:cNvPr id="5" name="Imagen 4">
+            <a:extLst>
+              <a:ext uri="{FF2B5EF4-FFF2-40B4-BE49-F238E27FC236}">
+                <a16:creationId xmlns:a16="http://schemas.microsoft.com/office/drawing/2014/main" id="{31109AF3-2652-4D3A-9188-90936A7239B5}"/>
+              </a:ext>
+            </a:extLst>
+          </p:cNvPr>
+          <p:cNvPicPr>
+            <a:picLocks noChangeAspect="1"/>
+          </p:cNvPicPr>
+          <p:nvPr/>
+        </p:nvPicPr>
+        <p:blipFill>
+          <a:blip r:embed="rId2"/>
+          <a:stretch>
+            <a:fillRect/>
+          </a:stretch>
+        </p:blipFill>
+        <p:spPr>
+          <a:xfrm>
+            <a:off x="2275138" y="1459149"/>
+            <a:ext cx="7641724" cy="5150188"/>
+          </a:xfrm>
+          <a:prstGeom prst="rect">
+            <a:avLst/>
+          </a:prstGeom>
+        </p:spPr>
+      </p:pic>
+    </p:spTree>
+    <p:extLst>
+      <p:ext uri="{BB962C8B-B14F-4D97-AF65-F5344CB8AC3E}">
+        <p14:creationId xmlns:p14="http://schemas.microsoft.com/office/powerpoint/2010/main" val="1421981903"/>
+      </p:ext>
+    </p:extLst>
+  </p:cSld>
+  <p:clrMapOvr>
+    <a:masterClrMapping/>
+  </p:clrMapOvr>
+</p:sld>
+</file>
+
+<file path=ppt/slides/slide6.xml><?xml version="1.0" encoding="utf-8"?>
+<p:sld xmlns:a="http://schemas.openxmlformats.org/drawingml/2006/main" xmlns:r="http://schemas.openxmlformats.org/officeDocument/2006/relationships" xmlns:p="http://schemas.openxmlformats.org/presentationml/2006/main">
+  <p:cSld>
+    <p:spTree>
+      <p:nvGrpSpPr>
+        <p:cNvPr id="1" name=""/>
+        <p:cNvGrpSpPr/>
+        <p:nvPr/>
+      </p:nvGrpSpPr>
+      <p:grpSpPr>
+        <a:xfrm>
+          <a:off x="0" y="0"/>
+          <a:ext cx="0" cy="0"/>
+          <a:chOff x="0" y="0"/>
+          <a:chExt cx="0" cy="0"/>
+        </a:xfrm>
+      </p:grpSpPr>
+      <p:sp>
+        <p:nvSpPr>
+          <p:cNvPr id="2" name="Título 1">
+            <a:extLst>
+              <a:ext uri="{FF2B5EF4-FFF2-40B4-BE49-F238E27FC236}">
+                <a16:creationId xmlns:a16="http://schemas.microsoft.com/office/drawing/2014/main" id="{0F4331B6-8FF2-4B71-8D0F-F8EA3F9B512C}"/>
+              </a:ext>
+            </a:extLst>
+          </p:cNvPr>
+          <p:cNvSpPr>
+            <a:spLocks noGrp="1"/>
+          </p:cNvSpPr>
+          <p:nvPr>
+            <p:ph type="title"/>
+          </p:nvPr>
+        </p:nvSpPr>
+        <p:spPr/>
+        <p:txBody>
+          <a:bodyPr/>
+          <a:lstStyle/>
+          <a:p>
+            <a:r>
+              <a:rPr lang="es-ES" dirty="0"/>
+              <a:t>Trabajando con</a:t>
+            </a:r>
+          </a:p>
+        </p:txBody>
+      </p:sp>
+      <p:pic>
+        <p:nvPicPr>
+          <p:cNvPr id="9" name="Imagen 8">
+            <a:extLst>
+              <a:ext uri="{FF2B5EF4-FFF2-40B4-BE49-F238E27FC236}">
+                <a16:creationId xmlns:a16="http://schemas.microsoft.com/office/drawing/2014/main" id="{ADBA540F-E5D2-42CE-8A81-93C90C9FE4AE}"/>
+              </a:ext>
+            </a:extLst>
+          </p:cNvPr>
+          <p:cNvPicPr>
+            <a:picLocks noChangeAspect="1"/>
+          </p:cNvPicPr>
+          <p:nvPr/>
+        </p:nvPicPr>
+        <p:blipFill>
+          <a:blip r:embed="rId2"/>
+          <a:stretch>
+            <a:fillRect/>
+          </a:stretch>
+        </p:blipFill>
+        <p:spPr>
+          <a:xfrm>
+            <a:off x="83090" y="1789890"/>
+            <a:ext cx="6369084" cy="4393862"/>
+          </a:xfrm>
+          <a:prstGeom prst="rect">
+            <a:avLst/>
+          </a:prstGeom>
+        </p:spPr>
+      </p:pic>
+      <p:pic>
+        <p:nvPicPr>
+          <p:cNvPr id="11" name="Imagen 10">
+            <a:extLst>
+              <a:ext uri="{FF2B5EF4-FFF2-40B4-BE49-F238E27FC236}">
+                <a16:creationId xmlns:a16="http://schemas.microsoft.com/office/drawing/2014/main" id="{E455584D-56E3-41D5-A497-A70CD52F8A70}"/>
+              </a:ext>
+            </a:extLst>
+          </p:cNvPr>
+          <p:cNvPicPr>
+            <a:picLocks noChangeAspect="1"/>
+          </p:cNvPicPr>
+          <p:nvPr/>
+        </p:nvPicPr>
+        <p:blipFill>
+          <a:blip r:embed="rId3"/>
+          <a:stretch>
+            <a:fillRect/>
+          </a:stretch>
+        </p:blipFill>
+        <p:spPr>
+          <a:xfrm>
+            <a:off x="7173797" y="1690688"/>
+            <a:ext cx="4387721" cy="4629070"/>
+          </a:xfrm>
+          <a:prstGeom prst="rect">
+            <a:avLst/>
+          </a:prstGeom>
+        </p:spPr>
+      </p:pic>
+      <p:pic>
+        <p:nvPicPr>
+          <p:cNvPr id="5" name="Picture 2" descr="⇨ Introducción a git: Comandos y funciones de git más frecuentes">
+            <a:extLst>
+              <a:ext uri="{FF2B5EF4-FFF2-40B4-BE49-F238E27FC236}">
+                <a16:creationId xmlns:a16="http://schemas.microsoft.com/office/drawing/2014/main" id="{11A8FE93-BEF8-4BBD-8A60-F55C1284CE7A}"/>
+              </a:ext>
+            </a:extLst>
+          </p:cNvPr>
+          <p:cNvPicPr>
+            <a:picLocks noChangeAspect="1" noChangeArrowheads="1"/>
+          </p:cNvPicPr>
+          <p:nvPr/>
+        </p:nvPicPr>
+        <p:blipFill>
+          <a:blip r:embed="rId4">
+            <a:extLst>
+              <a:ext uri="{28A0092B-C50C-407E-A947-70E740481C1C}">
+                <a14:useLocalDpi xmlns:a14="http://schemas.microsoft.com/office/drawing/2010/main" val="0"/>
+              </a:ext>
+            </a:extLst>
+          </a:blip>
+          <a:srcRect/>
+          <a:stretch>
+            <a:fillRect/>
+          </a:stretch>
+        </p:blipFill>
+        <p:spPr bwMode="auto">
+          <a:xfrm>
+            <a:off x="4395318" y="537449"/>
+            <a:ext cx="1520415" cy="980913"/>
+          </a:xfrm>
+          <a:prstGeom prst="rect">
+            <a:avLst/>
+          </a:prstGeom>
+          <a:noFill/>
+          <a:extLst>
+            <a:ext uri="{909E8E84-426E-40DD-AFC4-6F175D3DCCD1}">
+              <a14:hiddenFill xmlns:a14="http://schemas.microsoft.com/office/drawing/2010/main">
+                <a:solidFill>
+                  <a:srgbClr val="FFFFFF"/>
+                </a:solidFill>
+              </a14:hiddenFill>
+            </a:ext>
+          </a:extLst>
+        </p:spPr>
+      </p:pic>
+    </p:spTree>
+    <p:extLst>
+      <p:ext uri="{BB962C8B-B14F-4D97-AF65-F5344CB8AC3E}">
+        <p14:creationId xmlns:p14="http://schemas.microsoft.com/office/powerpoint/2010/main" val="2441548227"/>
+      </p:ext>
+    </p:extLst>
+  </p:cSld>
+  <p:clrMapOvr>
+    <a:masterClrMapping/>
+  </p:clrMapOvr>
+</p:sld>
+</file>
+
+<file path=ppt/slides/slide60.xml><?xml version="1.0" encoding="utf-8"?>
 <p:sld xmlns:a="http://schemas.openxmlformats.org/drawingml/2006/main" xmlns:r="http://schemas.openxmlformats.org/officeDocument/2006/relationships" xmlns:p="http://schemas.openxmlformats.org/presentationml/2006/main">
   <p:cSld>
     <p:spTree>
@@ -12887,7 +13320,7 @@
 </p:sld>
 </file>
 
-<file path=ppt/slides/slide58.xml><?xml version="1.0" encoding="utf-8"?>
+<file path=ppt/slides/slide61.xml><?xml version="1.0" encoding="utf-8"?>
 <p:sld xmlns:a="http://schemas.openxmlformats.org/drawingml/2006/main" xmlns:r="http://schemas.openxmlformats.org/officeDocument/2006/relationships" xmlns:p="http://schemas.openxmlformats.org/presentationml/2006/main">
   <p:cSld>
     <p:spTree>
@@ -12966,171 +13399,6 @@
     <p:extLst>
       <p:ext uri="{BB962C8B-B14F-4D97-AF65-F5344CB8AC3E}">
         <p14:creationId xmlns:p14="http://schemas.microsoft.com/office/powerpoint/2010/main" val="95088341"/>
-      </p:ext>
-    </p:extLst>
-  </p:cSld>
-  <p:clrMapOvr>
-    <a:masterClrMapping/>
-  </p:clrMapOvr>
-</p:sld>
-</file>
-
-<file path=ppt/slides/slide6.xml><?xml version="1.0" encoding="utf-8"?>
-<p:sld xmlns:a="http://schemas.openxmlformats.org/drawingml/2006/main" xmlns:r="http://schemas.openxmlformats.org/officeDocument/2006/relationships" xmlns:p="http://schemas.openxmlformats.org/presentationml/2006/main">
-  <p:cSld>
-    <p:spTree>
-      <p:nvGrpSpPr>
-        <p:cNvPr id="1" name=""/>
-        <p:cNvGrpSpPr/>
-        <p:nvPr/>
-      </p:nvGrpSpPr>
-      <p:grpSpPr>
-        <a:xfrm>
-          <a:off x="0" y="0"/>
-          <a:ext cx="0" cy="0"/>
-          <a:chOff x="0" y="0"/>
-          <a:chExt cx="0" cy="0"/>
-        </a:xfrm>
-      </p:grpSpPr>
-      <p:sp>
-        <p:nvSpPr>
-          <p:cNvPr id="2" name="Título 1">
-            <a:extLst>
-              <a:ext uri="{FF2B5EF4-FFF2-40B4-BE49-F238E27FC236}">
-                <a16:creationId xmlns:a16="http://schemas.microsoft.com/office/drawing/2014/main" id="{0F4331B6-8FF2-4B71-8D0F-F8EA3F9B512C}"/>
-              </a:ext>
-            </a:extLst>
-          </p:cNvPr>
-          <p:cNvSpPr>
-            <a:spLocks noGrp="1"/>
-          </p:cNvSpPr>
-          <p:nvPr>
-            <p:ph type="title"/>
-          </p:nvPr>
-        </p:nvSpPr>
-        <p:spPr/>
-        <p:txBody>
-          <a:bodyPr/>
-          <a:lstStyle/>
-          <a:p>
-            <a:r>
-              <a:rPr lang="es-ES" dirty="0"/>
-              <a:t>Trabajando con</a:t>
-            </a:r>
-          </a:p>
-        </p:txBody>
-      </p:sp>
-      <p:pic>
-        <p:nvPicPr>
-          <p:cNvPr id="9" name="Imagen 8">
-            <a:extLst>
-              <a:ext uri="{FF2B5EF4-FFF2-40B4-BE49-F238E27FC236}">
-                <a16:creationId xmlns:a16="http://schemas.microsoft.com/office/drawing/2014/main" id="{ADBA540F-E5D2-42CE-8A81-93C90C9FE4AE}"/>
-              </a:ext>
-            </a:extLst>
-          </p:cNvPr>
-          <p:cNvPicPr>
-            <a:picLocks noChangeAspect="1"/>
-          </p:cNvPicPr>
-          <p:nvPr/>
-        </p:nvPicPr>
-        <p:blipFill>
-          <a:blip r:embed="rId2"/>
-          <a:stretch>
-            <a:fillRect/>
-          </a:stretch>
-        </p:blipFill>
-        <p:spPr>
-          <a:xfrm>
-            <a:off x="83090" y="1789890"/>
-            <a:ext cx="6369084" cy="4393862"/>
-          </a:xfrm>
-          <a:prstGeom prst="rect">
-            <a:avLst/>
-          </a:prstGeom>
-        </p:spPr>
-      </p:pic>
-      <p:pic>
-        <p:nvPicPr>
-          <p:cNvPr id="11" name="Imagen 10">
-            <a:extLst>
-              <a:ext uri="{FF2B5EF4-FFF2-40B4-BE49-F238E27FC236}">
-                <a16:creationId xmlns:a16="http://schemas.microsoft.com/office/drawing/2014/main" id="{E455584D-56E3-41D5-A497-A70CD52F8A70}"/>
-              </a:ext>
-            </a:extLst>
-          </p:cNvPr>
-          <p:cNvPicPr>
-            <a:picLocks noChangeAspect="1"/>
-          </p:cNvPicPr>
-          <p:nvPr/>
-        </p:nvPicPr>
-        <p:blipFill>
-          <a:blip r:embed="rId3"/>
-          <a:stretch>
-            <a:fillRect/>
-          </a:stretch>
-        </p:blipFill>
-        <p:spPr>
-          <a:xfrm>
-            <a:off x="7173797" y="1690688"/>
-            <a:ext cx="4387721" cy="4629070"/>
-          </a:xfrm>
-          <a:prstGeom prst="rect">
-            <a:avLst/>
-          </a:prstGeom>
-        </p:spPr>
-      </p:pic>
-      <p:pic>
-        <p:nvPicPr>
-          <p:cNvPr id="5" name="Picture 2" descr="⇨ Introducción a git: Comandos y funciones de git más frecuentes">
-            <a:extLst>
-              <a:ext uri="{FF2B5EF4-FFF2-40B4-BE49-F238E27FC236}">
-                <a16:creationId xmlns:a16="http://schemas.microsoft.com/office/drawing/2014/main" id="{11A8FE93-BEF8-4BBD-8A60-F55C1284CE7A}"/>
-              </a:ext>
-            </a:extLst>
-          </p:cNvPr>
-          <p:cNvPicPr>
-            <a:picLocks noChangeAspect="1" noChangeArrowheads="1"/>
-          </p:cNvPicPr>
-          <p:nvPr/>
-        </p:nvPicPr>
-        <p:blipFill>
-          <a:blip r:embed="rId4">
-            <a:extLst>
-              <a:ext uri="{28A0092B-C50C-407E-A947-70E740481C1C}">
-                <a14:useLocalDpi xmlns:a14="http://schemas.microsoft.com/office/drawing/2010/main" val="0"/>
-              </a:ext>
-            </a:extLst>
-          </a:blip>
-          <a:srcRect/>
-          <a:stretch>
-            <a:fillRect/>
-          </a:stretch>
-        </p:blipFill>
-        <p:spPr bwMode="auto">
-          <a:xfrm>
-            <a:off x="4395318" y="537449"/>
-            <a:ext cx="1520415" cy="980913"/>
-          </a:xfrm>
-          <a:prstGeom prst="rect">
-            <a:avLst/>
-          </a:prstGeom>
-          <a:noFill/>
-          <a:extLst>
-            <a:ext uri="{909E8E84-426E-40DD-AFC4-6F175D3DCCD1}">
-              <a14:hiddenFill xmlns:a14="http://schemas.microsoft.com/office/drawing/2010/main">
-                <a:solidFill>
-                  <a:srgbClr val="FFFFFF"/>
-                </a:solidFill>
-              </a14:hiddenFill>
-            </a:ext>
-          </a:extLst>
-        </p:spPr>
-      </p:pic>
-    </p:spTree>
-    <p:extLst>
-      <p:ext uri="{BB962C8B-B14F-4D97-AF65-F5344CB8AC3E}">
-        <p14:creationId xmlns:p14="http://schemas.microsoft.com/office/powerpoint/2010/main" val="2441548227"/>
       </p:ext>
     </p:extLst>
   </p:cSld>

</xml_diff>